<commit_message>
Updated push notification slides.
</commit_message>
<xml_diff>
--- a/Auckland/Day 3/Push Notification/Push Notification.pptx
+++ b/Auckland/Day 3/Push Notification/Push Notification.pptx
@@ -5,12 +5,14 @@
     <p:sldMasterId id="2147483660" r:id="rId1"/>
   </p:sldMasterIdLst>
   <p:notesMasterIdLst>
-    <p:notesMasterId r:id="rId5"/>
+    <p:notesMasterId r:id="rId7"/>
   </p:notesMasterIdLst>
   <p:sldIdLst>
     <p:sldId id="259" r:id="rId2"/>
     <p:sldId id="288" r:id="rId3"/>
     <p:sldId id="289" r:id="rId4"/>
+    <p:sldId id="290" r:id="rId5"/>
+    <p:sldId id="291" r:id="rId6"/>
   </p:sldIdLst>
   <p:sldSz cx="12192000" cy="6858000"/>
   <p:notesSz cx="6858000" cy="9144000"/>
@@ -9108,13 +9110,325 @@
                   <a:schemeClr val="tx1"/>
                 </a:solidFill>
               </a:rPr>
-              <a:t>Why are they useful?</a:t>
+              <a:t>How </a:t>
+            </a:r>
+            <a:r>
+              <a:rPr lang="en-AU" sz="6000" dirty="0" smtClean="0">
+                <a:solidFill>
+                  <a:schemeClr val="tx1"/>
+                </a:solidFill>
+              </a:rPr>
+              <a:t>are they useful?</a:t>
             </a:r>
             <a:endParaRPr lang="en-US" sz="6000" b="1" dirty="0">
               <a:solidFill>
                 <a:schemeClr val="tx1"/>
               </a:solidFill>
             </a:endParaRPr>
+          </a:p>
+        </p:txBody>
+      </p:sp>
+      <p:sp>
+        <p:nvSpPr>
+          <p:cNvPr id="4" name="Content Placeholder 2"/>
+          <p:cNvSpPr txBox="1">
+            <a:spLocks/>
+          </p:cNvSpPr>
+          <p:nvPr/>
+        </p:nvSpPr>
+        <p:spPr>
+          <a:xfrm>
+            <a:off x="838200" y="1825625"/>
+            <a:ext cx="10515600" cy="4351338"/>
+          </a:xfrm>
+          <a:prstGeom prst="rect">
+            <a:avLst/>
+          </a:prstGeom>
+        </p:spPr>
+        <p:txBody>
+          <a:bodyPr/>
+          <a:lstStyle>
+            <a:lvl1pPr marL="336145" marR="0" indent="-336145" algn="l" defTabSz="914367" rtl="0" eaLnBrk="1" fontAlgn="auto" latinLnBrk="0" hangingPunct="1">
+              <a:lnSpc>
+                <a:spcPct val="90000"/>
+              </a:lnSpc>
+              <a:spcBef>
+                <a:spcPct val="20000"/>
+              </a:spcBef>
+              <a:spcAft>
+                <a:spcPts val="0"/>
+              </a:spcAft>
+              <a:buClr>
+                <a:schemeClr val="tx1"/>
+              </a:buClr>
+              <a:buSzPct val="100000"/>
+              <a:buFontTx/>
+              <a:buBlip>
+                <a:blip r:embed="rId2"/>
+              </a:buBlip>
+              <a:tabLst/>
+              <a:defRPr sz="3921" kern="1200" spc="0" baseline="0">
+                <a:gradFill>
+                  <a:gsLst>
+                    <a:gs pos="1250">
+                      <a:schemeClr val="tx1"/>
+                    </a:gs>
+                    <a:gs pos="100000">
+                      <a:schemeClr val="tx1"/>
+                    </a:gs>
+                  </a:gsLst>
+                  <a:lin ang="5400000" scaled="0"/>
+                </a:gradFill>
+                <a:latin typeface="+mj-lt"/>
+                <a:ea typeface="+mn-ea"/>
+                <a:cs typeface="+mn-cs"/>
+              </a:defRPr>
+            </a:lvl1pPr>
+            <a:lvl2pPr marL="572691" marR="0" indent="-236546" algn="l" defTabSz="914367" rtl="0" eaLnBrk="1" fontAlgn="auto" latinLnBrk="0" hangingPunct="1">
+              <a:lnSpc>
+                <a:spcPct val="90000"/>
+              </a:lnSpc>
+              <a:spcBef>
+                <a:spcPct val="20000"/>
+              </a:spcBef>
+              <a:spcAft>
+                <a:spcPts val="0"/>
+              </a:spcAft>
+              <a:buClr>
+                <a:schemeClr val="tx1"/>
+              </a:buClr>
+              <a:buSzPct val="100000"/>
+              <a:buFontTx/>
+              <a:buBlip>
+                <a:blip r:embed="rId2"/>
+              </a:buBlip>
+              <a:tabLst/>
+              <a:defRPr sz="2353" kern="1200" spc="0" baseline="0">
+                <a:gradFill>
+                  <a:gsLst>
+                    <a:gs pos="1250">
+                      <a:schemeClr val="tx1"/>
+                    </a:gs>
+                    <a:gs pos="100000">
+                      <a:schemeClr val="tx1"/>
+                    </a:gs>
+                  </a:gsLst>
+                  <a:lin ang="5400000" scaled="0"/>
+                </a:gradFill>
+                <a:latin typeface="+mn-lt"/>
+                <a:ea typeface="+mn-ea"/>
+                <a:cs typeface="+mn-cs"/>
+              </a:defRPr>
+            </a:lvl2pPr>
+            <a:lvl3pPr marL="784338" marR="0" indent="-224097" algn="l" defTabSz="914367" rtl="0" eaLnBrk="1" fontAlgn="auto" latinLnBrk="0" hangingPunct="1">
+              <a:lnSpc>
+                <a:spcPct val="90000"/>
+              </a:lnSpc>
+              <a:spcBef>
+                <a:spcPct val="20000"/>
+              </a:spcBef>
+              <a:spcAft>
+                <a:spcPts val="0"/>
+              </a:spcAft>
+              <a:buClr>
+                <a:schemeClr val="tx1"/>
+              </a:buClr>
+              <a:buSzPct val="100000"/>
+              <a:buFontTx/>
+              <a:buBlip>
+                <a:blip r:embed="rId2"/>
+              </a:buBlip>
+              <a:tabLst/>
+              <a:defRPr sz="2353" kern="1200" spc="0" baseline="0">
+                <a:gradFill>
+                  <a:gsLst>
+                    <a:gs pos="1250">
+                      <a:schemeClr val="tx1"/>
+                    </a:gs>
+                    <a:gs pos="100000">
+                      <a:schemeClr val="tx1"/>
+                    </a:gs>
+                  </a:gsLst>
+                  <a:lin ang="5400000" scaled="0"/>
+                </a:gradFill>
+                <a:latin typeface="+mn-lt"/>
+                <a:ea typeface="+mn-ea"/>
+                <a:cs typeface="+mn-cs"/>
+              </a:defRPr>
+            </a:lvl3pPr>
+            <a:lvl4pPr marL="1008435" marR="0" indent="-224097" algn="l" defTabSz="914367" rtl="0" eaLnBrk="1" fontAlgn="auto" latinLnBrk="0" hangingPunct="1">
+              <a:lnSpc>
+                <a:spcPct val="90000"/>
+              </a:lnSpc>
+              <a:spcBef>
+                <a:spcPct val="20000"/>
+              </a:spcBef>
+              <a:spcAft>
+                <a:spcPts val="0"/>
+              </a:spcAft>
+              <a:buClr>
+                <a:schemeClr val="tx1"/>
+              </a:buClr>
+              <a:buSzPct val="100000"/>
+              <a:buFontTx/>
+              <a:buBlip>
+                <a:blip r:embed="rId2"/>
+              </a:buBlip>
+              <a:tabLst/>
+              <a:defRPr sz="1961" kern="1200" spc="0" baseline="0">
+                <a:gradFill>
+                  <a:gsLst>
+                    <a:gs pos="1250">
+                      <a:schemeClr val="tx1"/>
+                    </a:gs>
+                    <a:gs pos="100000">
+                      <a:schemeClr val="tx1"/>
+                    </a:gs>
+                  </a:gsLst>
+                  <a:lin ang="5400000" scaled="0"/>
+                </a:gradFill>
+                <a:latin typeface="+mn-lt"/>
+                <a:ea typeface="+mn-ea"/>
+                <a:cs typeface="+mn-cs"/>
+              </a:defRPr>
+            </a:lvl4pPr>
+            <a:lvl5pPr marL="1232531" marR="0" indent="-224097" algn="l" defTabSz="914367" rtl="0" eaLnBrk="1" fontAlgn="auto" latinLnBrk="0" hangingPunct="1">
+              <a:lnSpc>
+                <a:spcPct val="90000"/>
+              </a:lnSpc>
+              <a:spcBef>
+                <a:spcPct val="20000"/>
+              </a:spcBef>
+              <a:spcAft>
+                <a:spcPts val="0"/>
+              </a:spcAft>
+              <a:buClr>
+                <a:schemeClr val="tx1"/>
+              </a:buClr>
+              <a:buSzPct val="100000"/>
+              <a:buFontTx/>
+              <a:buBlip>
+                <a:blip r:embed="rId2"/>
+              </a:buBlip>
+              <a:tabLst/>
+              <a:defRPr sz="1961" kern="1200" spc="0" baseline="0">
+                <a:gradFill>
+                  <a:gsLst>
+                    <a:gs pos="1250">
+                      <a:schemeClr val="tx1"/>
+                    </a:gs>
+                    <a:gs pos="100000">
+                      <a:schemeClr val="tx1"/>
+                    </a:gs>
+                  </a:gsLst>
+                  <a:lin ang="5400000" scaled="0"/>
+                </a:gradFill>
+                <a:latin typeface="+mn-lt"/>
+                <a:ea typeface="+mn-ea"/>
+                <a:cs typeface="+mn-cs"/>
+              </a:defRPr>
+            </a:lvl5pPr>
+            <a:lvl6pPr marL="2514509" indent="-228592" algn="l" defTabSz="914367" rtl="0" eaLnBrk="1" latinLnBrk="0" hangingPunct="1">
+              <a:spcBef>
+                <a:spcPct val="20000"/>
+              </a:spcBef>
+              <a:buFont typeface="Arial" pitchFamily="34" charset="0"/>
+              <a:buChar char="•"/>
+              <a:defRPr sz="1961" kern="1200">
+                <a:solidFill>
+                  <a:schemeClr val="tx1"/>
+                </a:solidFill>
+                <a:latin typeface="+mn-lt"/>
+                <a:ea typeface="+mn-ea"/>
+                <a:cs typeface="+mn-cs"/>
+              </a:defRPr>
+            </a:lvl6pPr>
+            <a:lvl7pPr marL="2971693" indent="-228592" algn="l" defTabSz="914367" rtl="0" eaLnBrk="1" latinLnBrk="0" hangingPunct="1">
+              <a:spcBef>
+                <a:spcPct val="20000"/>
+              </a:spcBef>
+              <a:buFont typeface="Arial" pitchFamily="34" charset="0"/>
+              <a:buChar char="•"/>
+              <a:defRPr sz="1961" kern="1200">
+                <a:solidFill>
+                  <a:schemeClr val="tx1"/>
+                </a:solidFill>
+                <a:latin typeface="+mn-lt"/>
+                <a:ea typeface="+mn-ea"/>
+                <a:cs typeface="+mn-cs"/>
+              </a:defRPr>
+            </a:lvl7pPr>
+            <a:lvl8pPr marL="3428877" indent="-228592" algn="l" defTabSz="914367" rtl="0" eaLnBrk="1" latinLnBrk="0" hangingPunct="1">
+              <a:spcBef>
+                <a:spcPct val="20000"/>
+              </a:spcBef>
+              <a:buFont typeface="Arial" pitchFamily="34" charset="0"/>
+              <a:buChar char="•"/>
+              <a:defRPr sz="1961" kern="1200">
+                <a:solidFill>
+                  <a:schemeClr val="tx1"/>
+                </a:solidFill>
+                <a:latin typeface="+mn-lt"/>
+                <a:ea typeface="+mn-ea"/>
+                <a:cs typeface="+mn-cs"/>
+              </a:defRPr>
+            </a:lvl8pPr>
+            <a:lvl9pPr marL="3886061" indent="-228592" algn="l" defTabSz="914367" rtl="0" eaLnBrk="1" latinLnBrk="0" hangingPunct="1">
+              <a:spcBef>
+                <a:spcPct val="20000"/>
+              </a:spcBef>
+              <a:buFont typeface="Arial" pitchFamily="34" charset="0"/>
+              <a:buChar char="•"/>
+              <a:defRPr sz="1961" kern="1200">
+                <a:solidFill>
+                  <a:schemeClr val="tx1"/>
+                </a:solidFill>
+                <a:latin typeface="+mn-lt"/>
+                <a:ea typeface="+mn-ea"/>
+                <a:cs typeface="+mn-cs"/>
+              </a:defRPr>
+            </a:lvl9pPr>
+          </a:lstStyle>
+          <a:p>
+            <a:pPr>
+              <a:buFont typeface="Arial" panose="020B0604020202020204" pitchFamily="34" charset="0"/>
+              <a:buChar char="•"/>
+            </a:pPr>
+            <a:r>
+              <a:rPr lang="en-AU" dirty="0" smtClean="0"/>
+              <a:t>Provides a way to engage with your users</a:t>
+            </a:r>
+          </a:p>
+          <a:p>
+            <a:pPr>
+              <a:buFont typeface="Arial" panose="020B0604020202020204" pitchFamily="34" charset="0"/>
+              <a:buChar char="•"/>
+            </a:pPr>
+            <a:r>
+              <a:rPr lang="en-AU" dirty="0" smtClean="0"/>
+              <a:t>Enriches user experience</a:t>
+            </a:r>
+          </a:p>
+          <a:p>
+            <a:pPr>
+              <a:buFont typeface="Arial" panose="020B0604020202020204" pitchFamily="34" charset="0"/>
+              <a:buChar char="•"/>
+            </a:pPr>
+            <a:r>
+              <a:rPr lang="en-AU" dirty="0" smtClean="0"/>
+              <a:t>Keeps users within your app’s ecosystem</a:t>
+            </a:r>
+          </a:p>
+          <a:p>
+            <a:pPr>
+              <a:buFont typeface="Arial" panose="020B0604020202020204" pitchFamily="34" charset="0"/>
+              <a:buChar char="•"/>
+            </a:pPr>
+            <a:r>
+              <a:rPr lang="en-AU" dirty="0" smtClean="0"/>
+              <a:t>Brings the user back to your app</a:t>
+            </a:r>
+            <a:endParaRPr lang="en-AU" dirty="0"/>
           </a:p>
         </p:txBody>
       </p:sp>
@@ -9122,6 +9436,234 @@
     <p:extLst>
       <p:ext uri="{BB962C8B-B14F-4D97-AF65-F5344CB8AC3E}">
         <p14:creationId xmlns:p14="http://schemas.microsoft.com/office/powerpoint/2010/main" val="3705731177"/>
+      </p:ext>
+    </p:extLst>
+  </p:cSld>
+  <p:clrMapOvr>
+    <a:masterClrMapping/>
+  </p:clrMapOvr>
+  <p:transition>
+    <p:fade/>
+  </p:transition>
+  <p:timing>
+    <p:tnLst>
+      <p:par>
+        <p:cTn id="1" dur="indefinite" restart="never" nodeType="tmRoot"/>
+      </p:par>
+    </p:tnLst>
+  </p:timing>
+</p:sld>
+</file>
+
+<file path=ppt/slides/slide4.xml><?xml version="1.0" encoding="utf-8"?>
+<p:sld xmlns:a="http://schemas.openxmlformats.org/drawingml/2006/main" xmlns:r="http://schemas.openxmlformats.org/officeDocument/2006/relationships" xmlns:p="http://schemas.openxmlformats.org/presentationml/2006/main">
+  <p:cSld>
+    <p:bg>
+      <p:bgPr>
+        <a:solidFill>
+          <a:srgbClr val="7030A0"/>
+        </a:solidFill>
+        <a:effectLst/>
+      </p:bgPr>
+    </p:bg>
+    <p:spTree>
+      <p:nvGrpSpPr>
+        <p:cNvPr id="1" name=""/>
+        <p:cNvGrpSpPr/>
+        <p:nvPr/>
+      </p:nvGrpSpPr>
+      <p:grpSpPr>
+        <a:xfrm>
+          <a:off x="0" y="0"/>
+          <a:ext cx="0" cy="0"/>
+          <a:chOff x="0" y="0"/>
+          <a:chExt cx="0" cy="0"/>
+        </a:xfrm>
+      </p:grpSpPr>
+      <p:sp>
+        <p:nvSpPr>
+          <p:cNvPr id="6" name="Title 3"/>
+          <p:cNvSpPr>
+            <a:spLocks noGrp="1"/>
+          </p:cNvSpPr>
+          <p:nvPr>
+            <p:ph type="title" idx="4294967295"/>
+          </p:nvPr>
+        </p:nvSpPr>
+        <p:spPr>
+          <a:xfrm>
+            <a:off x="366090" y="413946"/>
+            <a:ext cx="8067823" cy="1411679"/>
+          </a:xfrm>
+        </p:spPr>
+        <p:txBody>
+          <a:bodyPr/>
+          <a:lstStyle/>
+          <a:p>
+            <a:r>
+              <a:rPr lang="en-AU" sz="6000" dirty="0" smtClean="0">
+                <a:solidFill>
+                  <a:schemeClr val="tx1"/>
+                </a:solidFill>
+              </a:rPr>
+              <a:t>How does it work?</a:t>
+            </a:r>
+            <a:endParaRPr lang="en-US" sz="6000" b="1" dirty="0">
+              <a:solidFill>
+                <a:schemeClr val="tx1"/>
+              </a:solidFill>
+            </a:endParaRPr>
+          </a:p>
+        </p:txBody>
+      </p:sp>
+      <p:pic>
+        <p:nvPicPr>
+          <p:cNvPr id="10" name="Picture 9"/>
+          <p:cNvPicPr>
+            <a:picLocks noChangeAspect="1"/>
+          </p:cNvPicPr>
+          <p:nvPr/>
+        </p:nvPicPr>
+        <p:blipFill>
+          <a:blip r:embed="rId2">
+            <a:extLst>
+              <a:ext uri="{28A0092B-C50C-407E-A947-70E740481C1C}">
+                <a14:useLocalDpi xmlns:a14="http://schemas.microsoft.com/office/drawing/2010/main" val="0"/>
+              </a:ext>
+            </a:extLst>
+          </a:blip>
+          <a:stretch>
+            <a:fillRect/>
+          </a:stretch>
+        </p:blipFill>
+        <p:spPr>
+          <a:xfrm>
+            <a:off x="1698430" y="1745615"/>
+            <a:ext cx="8370622" cy="4139983"/>
+          </a:xfrm>
+          <a:prstGeom prst="rect">
+            <a:avLst/>
+          </a:prstGeom>
+        </p:spPr>
+      </p:pic>
+    </p:spTree>
+    <p:extLst>
+      <p:ext uri="{BB962C8B-B14F-4D97-AF65-F5344CB8AC3E}">
+        <p14:creationId xmlns:p14="http://schemas.microsoft.com/office/powerpoint/2010/main" val="1631305274"/>
+      </p:ext>
+    </p:extLst>
+  </p:cSld>
+  <p:clrMapOvr>
+    <a:masterClrMapping/>
+  </p:clrMapOvr>
+  <p:transition>
+    <p:fade/>
+  </p:transition>
+  <p:timing>
+    <p:tnLst>
+      <p:par>
+        <p:cTn id="1" dur="indefinite" restart="never" nodeType="tmRoot"/>
+      </p:par>
+    </p:tnLst>
+  </p:timing>
+</p:sld>
+</file>
+
+<file path=ppt/slides/slide5.xml><?xml version="1.0" encoding="utf-8"?>
+<p:sld xmlns:a="http://schemas.openxmlformats.org/drawingml/2006/main" xmlns:r="http://schemas.openxmlformats.org/officeDocument/2006/relationships" xmlns:p="http://schemas.openxmlformats.org/presentationml/2006/main">
+  <p:cSld>
+    <p:bg>
+      <p:bgPr>
+        <a:solidFill>
+          <a:srgbClr val="7030A0"/>
+        </a:solidFill>
+        <a:effectLst/>
+      </p:bgPr>
+    </p:bg>
+    <p:spTree>
+      <p:nvGrpSpPr>
+        <p:cNvPr id="1" name=""/>
+        <p:cNvGrpSpPr/>
+        <p:nvPr/>
+      </p:nvGrpSpPr>
+      <p:grpSpPr>
+        <a:xfrm>
+          <a:off x="0" y="0"/>
+          <a:ext cx="0" cy="0"/>
+          <a:chOff x="0" y="0"/>
+          <a:chExt cx="0" cy="0"/>
+        </a:xfrm>
+      </p:grpSpPr>
+      <p:sp>
+        <p:nvSpPr>
+          <p:cNvPr id="6" name="Title 3"/>
+          <p:cNvSpPr>
+            <a:spLocks noGrp="1"/>
+          </p:cNvSpPr>
+          <p:nvPr>
+            <p:ph type="title" idx="4294967295"/>
+          </p:nvPr>
+        </p:nvSpPr>
+        <p:spPr>
+          <a:xfrm>
+            <a:off x="366090" y="413946"/>
+            <a:ext cx="8067823" cy="1411679"/>
+          </a:xfrm>
+        </p:spPr>
+        <p:txBody>
+          <a:bodyPr/>
+          <a:lstStyle/>
+          <a:p>
+            <a:r>
+              <a:rPr lang="en-AU" sz="6000" dirty="0" smtClean="0">
+                <a:solidFill>
+                  <a:schemeClr val="tx1"/>
+                </a:solidFill>
+              </a:rPr>
+              <a:t>How does it work?</a:t>
+            </a:r>
+            <a:endParaRPr lang="en-US" sz="6000" b="1" dirty="0">
+              <a:solidFill>
+                <a:schemeClr val="tx1"/>
+              </a:solidFill>
+            </a:endParaRPr>
+          </a:p>
+        </p:txBody>
+      </p:sp>
+      <p:pic>
+        <p:nvPicPr>
+          <p:cNvPr id="2" name="Picture 1"/>
+          <p:cNvPicPr>
+            <a:picLocks noChangeAspect="1"/>
+          </p:cNvPicPr>
+          <p:nvPr/>
+        </p:nvPicPr>
+        <p:blipFill>
+          <a:blip r:embed="rId2">
+            <a:extLst>
+              <a:ext uri="{28A0092B-C50C-407E-A947-70E740481C1C}">
+                <a14:useLocalDpi xmlns:a14="http://schemas.microsoft.com/office/drawing/2010/main" val="0"/>
+              </a:ext>
+            </a:extLst>
+          </a:blip>
+          <a:stretch>
+            <a:fillRect/>
+          </a:stretch>
+        </p:blipFill>
+        <p:spPr>
+          <a:xfrm>
+            <a:off x="1943547" y="1689317"/>
+            <a:ext cx="8215859" cy="3991393"/>
+          </a:xfrm>
+          <a:prstGeom prst="rect">
+            <a:avLst/>
+          </a:prstGeom>
+        </p:spPr>
+      </p:pic>
+    </p:spTree>
+    <p:extLst>
+      <p:ext uri="{BB962C8B-B14F-4D97-AF65-F5344CB8AC3E}">
+        <p14:creationId xmlns:p14="http://schemas.microsoft.com/office/powerpoint/2010/main" val="1834255795"/>
       </p:ext>
     </p:extLst>
   </p:cSld>

</xml_diff>